<commit_message>
kleiner Fehler im Check behoben
</commit_message>
<xml_diff>
--- a/digitale Notenverwaltung.pptx
+++ b/digitale Notenverwaltung.pptx
@@ -298,7 +298,7 @@
           <a:p>
             <a:fld id="{CE0275B1-3582-400C-A564-17E222E38A98}" type="datetimeFigureOut">
               <a:rPr lang="de-DE" smtClean="0"/>
-              <a:t>21.06.2015</a:t>
+              <a:t>22.07.2015</a:t>
             </a:fld>
             <a:endParaRPr lang="de-DE"/>
           </a:p>
@@ -468,7 +468,7 @@
           <a:p>
             <a:fld id="{CE0275B1-3582-400C-A564-17E222E38A98}" type="datetimeFigureOut">
               <a:rPr lang="de-DE" smtClean="0"/>
-              <a:t>21.06.2015</a:t>
+              <a:t>22.07.2015</a:t>
             </a:fld>
             <a:endParaRPr lang="de-DE"/>
           </a:p>
@@ -648,7 +648,7 @@
           <a:p>
             <a:fld id="{CE0275B1-3582-400C-A564-17E222E38A98}" type="datetimeFigureOut">
               <a:rPr lang="de-DE" smtClean="0"/>
-              <a:t>21.06.2015</a:t>
+              <a:t>22.07.2015</a:t>
             </a:fld>
             <a:endParaRPr lang="de-DE"/>
           </a:p>
@@ -818,7 +818,7 @@
           <a:p>
             <a:fld id="{CE0275B1-3582-400C-A564-17E222E38A98}" type="datetimeFigureOut">
               <a:rPr lang="de-DE" smtClean="0"/>
-              <a:t>21.06.2015</a:t>
+              <a:t>22.07.2015</a:t>
             </a:fld>
             <a:endParaRPr lang="de-DE"/>
           </a:p>
@@ -1064,7 +1064,7 @@
           <a:p>
             <a:fld id="{CE0275B1-3582-400C-A564-17E222E38A98}" type="datetimeFigureOut">
               <a:rPr lang="de-DE" smtClean="0"/>
-              <a:t>21.06.2015</a:t>
+              <a:t>22.07.2015</a:t>
             </a:fld>
             <a:endParaRPr lang="de-DE"/>
           </a:p>
@@ -1352,7 +1352,7 @@
           <a:p>
             <a:fld id="{CE0275B1-3582-400C-A564-17E222E38A98}" type="datetimeFigureOut">
               <a:rPr lang="de-DE" smtClean="0"/>
-              <a:t>21.06.2015</a:t>
+              <a:t>22.07.2015</a:t>
             </a:fld>
             <a:endParaRPr lang="de-DE"/>
           </a:p>
@@ -1774,7 +1774,7 @@
           <a:p>
             <a:fld id="{CE0275B1-3582-400C-A564-17E222E38A98}" type="datetimeFigureOut">
               <a:rPr lang="de-DE" smtClean="0"/>
-              <a:t>21.06.2015</a:t>
+              <a:t>22.07.2015</a:t>
             </a:fld>
             <a:endParaRPr lang="de-DE"/>
           </a:p>
@@ -1892,7 +1892,7 @@
           <a:p>
             <a:fld id="{CE0275B1-3582-400C-A564-17E222E38A98}" type="datetimeFigureOut">
               <a:rPr lang="de-DE" smtClean="0"/>
-              <a:t>21.06.2015</a:t>
+              <a:t>22.07.2015</a:t>
             </a:fld>
             <a:endParaRPr lang="de-DE"/>
           </a:p>
@@ -1987,7 +1987,7 @@
           <a:p>
             <a:fld id="{CE0275B1-3582-400C-A564-17E222E38A98}" type="datetimeFigureOut">
               <a:rPr lang="de-DE" smtClean="0"/>
-              <a:t>21.06.2015</a:t>
+              <a:t>22.07.2015</a:t>
             </a:fld>
             <a:endParaRPr lang="de-DE"/>
           </a:p>
@@ -2264,7 +2264,7 @@
           <a:p>
             <a:fld id="{CE0275B1-3582-400C-A564-17E222E38A98}" type="datetimeFigureOut">
               <a:rPr lang="de-DE" smtClean="0"/>
-              <a:t>21.06.2015</a:t>
+              <a:t>22.07.2015</a:t>
             </a:fld>
             <a:endParaRPr lang="de-DE"/>
           </a:p>
@@ -2517,7 +2517,7 @@
           <a:p>
             <a:fld id="{CE0275B1-3582-400C-A564-17E222E38A98}" type="datetimeFigureOut">
               <a:rPr lang="de-DE" smtClean="0"/>
-              <a:t>21.06.2015</a:t>
+              <a:t>22.07.2015</a:t>
             </a:fld>
             <a:endParaRPr lang="de-DE"/>
           </a:p>
@@ -2730,7 +2730,7 @@
           <a:p>
             <a:fld id="{CE0275B1-3582-400C-A564-17E222E38A98}" type="datetimeFigureOut">
               <a:rPr lang="de-DE" smtClean="0"/>
-              <a:t>21.06.2015</a:t>
+              <a:t>22.07.2015</a:t>
             </a:fld>
             <a:endParaRPr lang="de-DE"/>
           </a:p>
@@ -3646,13 +3646,8 @@
           <a:p>
             <a:r>
               <a:rPr lang="de-DE" dirty="0" smtClean="0"/>
-              <a:t>Fehlersuche und </a:t>
-            </a:r>
-            <a:r>
-              <a:rPr lang="de-DE" smtClean="0"/>
-              <a:t>-behebung</a:t>
-            </a:r>
-            <a:endParaRPr lang="de-DE" dirty="0" smtClean="0"/>
+              <a:t>Fehlersuche und -behebung</a:t>
+            </a:r>
           </a:p>
           <a:p>
             <a:pPr marL="0" indent="0">
@@ -3668,7 +3663,15 @@
             </a:r>
             <a:r>
               <a:rPr lang="de-DE" dirty="0" smtClean="0"/>
-              <a:t>: aktuell ca. 1500 Zeilen, Tendenz steigend)</a:t>
+              <a:t>: aktuell ca. </a:t>
+            </a:r>
+            <a:r>
+              <a:rPr lang="de-DE" smtClean="0"/>
+              <a:t>2100 </a:t>
+            </a:r>
+            <a:r>
+              <a:rPr lang="de-DE" dirty="0" smtClean="0"/>
+              <a:t>Zeilen, Tendenz steigend)</a:t>
             </a:r>
           </a:p>
           <a:p>
@@ -4129,11 +4132,7 @@
             <a:pPr lvl="1"/>
             <a:r>
               <a:rPr lang="de-DE" dirty="0" smtClean="0"/>
-              <a:t>immenser </a:t>
-            </a:r>
-            <a:r>
-              <a:rPr lang="de-DE" dirty="0" smtClean="0"/>
-              <a:t>Wartungsaufwand</a:t>
+              <a:t>immenser Wartungsaufwand</a:t>
             </a:r>
           </a:p>
           <a:p>
@@ -6499,8 +6498,8 @@
         </p:blipFill>
         <p:spPr bwMode="auto">
           <a:xfrm>
-            <a:off x="1064493" y="908720"/>
-            <a:ext cx="6049963" cy="4772025"/>
+            <a:off x="511660" y="332656"/>
+            <a:ext cx="7645332" cy="6030403"/>
           </a:xfrm>
           <a:prstGeom prst="rect">
             <a:avLst/>
@@ -6571,7 +6570,7 @@
                             </p:stCondLst>
                             <p:childTnLst>
                               <p:par>
-                                <p:cTn id="5" presetID="1" presetClass="entr" presetSubtype="0" fill="hold" nodeType="clickEffect">
+                                <p:cTn id="5" presetID="1" presetClass="entr" presetSubtype="0" fill="hold" grpId="0" nodeType="clickEffect">
                                   <p:stCondLst>
                                     <p:cond delay="0"/>
                                   </p:stCondLst>
@@ -6579,6 +6578,288 @@
                                     <p:set>
                                       <p:cBhvr>
                                         <p:cTn id="6" dur="1" fill="hold">
+                                          <p:stCondLst>
+                                            <p:cond delay="0"/>
+                                          </p:stCondLst>
+                                        </p:cTn>
+                                        <p:tgtEl>
+                                          <p:spTgt spid="3">
+                                            <p:txEl>
+                                              <p:pRg st="0" end="0"/>
+                                            </p:txEl>
+                                          </p:spTgt>
+                                        </p:tgtEl>
+                                        <p:attrNameLst>
+                                          <p:attrName>style.visibility</p:attrName>
+                                        </p:attrNameLst>
+                                      </p:cBhvr>
+                                      <p:to>
+                                        <p:strVal val="visible"/>
+                                      </p:to>
+                                    </p:set>
+                                  </p:childTnLst>
+                                </p:cTn>
+                              </p:par>
+                            </p:childTnLst>
+                          </p:cTn>
+                        </p:par>
+                      </p:childTnLst>
+                    </p:cTn>
+                  </p:par>
+                  <p:par>
+                    <p:cTn id="7" fill="hold">
+                      <p:stCondLst>
+                        <p:cond delay="indefinite"/>
+                      </p:stCondLst>
+                      <p:childTnLst>
+                        <p:par>
+                          <p:cTn id="8" fill="hold">
+                            <p:stCondLst>
+                              <p:cond delay="0"/>
+                            </p:stCondLst>
+                            <p:childTnLst>
+                              <p:par>
+                                <p:cTn id="9" presetID="1" presetClass="entr" presetSubtype="0" fill="hold" nodeType="clickEffect">
+                                  <p:stCondLst>
+                                    <p:cond delay="0"/>
+                                  </p:stCondLst>
+                                  <p:childTnLst>
+                                    <p:set>
+                                      <p:cBhvr>
+                                        <p:cTn id="10" dur="1" fill="hold">
+                                          <p:stCondLst>
+                                            <p:cond delay="0"/>
+                                          </p:stCondLst>
+                                        </p:cTn>
+                                        <p:tgtEl>
+                                          <p:spTgt spid="3074"/>
+                                        </p:tgtEl>
+                                        <p:attrNameLst>
+                                          <p:attrName>style.visibility</p:attrName>
+                                        </p:attrNameLst>
+                                      </p:cBhvr>
+                                      <p:to>
+                                        <p:strVal val="visible"/>
+                                      </p:to>
+                                    </p:set>
+                                  </p:childTnLst>
+                                </p:cTn>
+                              </p:par>
+                            </p:childTnLst>
+                          </p:cTn>
+                        </p:par>
+                      </p:childTnLst>
+                    </p:cTn>
+                  </p:par>
+                  <p:par>
+                    <p:cTn id="11" fill="hold">
+                      <p:stCondLst>
+                        <p:cond delay="indefinite"/>
+                      </p:stCondLst>
+                      <p:childTnLst>
+                        <p:par>
+                          <p:cTn id="12" fill="hold">
+                            <p:stCondLst>
+                              <p:cond delay="0"/>
+                            </p:stCondLst>
+                            <p:childTnLst>
+                              <p:par>
+                                <p:cTn id="13" presetID="1" presetClass="entr" presetSubtype="0" fill="hold" grpId="0" nodeType="clickEffect">
+                                  <p:stCondLst>
+                                    <p:cond delay="0"/>
+                                  </p:stCondLst>
+                                  <p:childTnLst>
+                                    <p:set>
+                                      <p:cBhvr>
+                                        <p:cTn id="14" dur="1" fill="hold">
+                                          <p:stCondLst>
+                                            <p:cond delay="0"/>
+                                          </p:stCondLst>
+                                        </p:cTn>
+                                        <p:tgtEl>
+                                          <p:spTgt spid="3">
+                                            <p:txEl>
+                                              <p:pRg st="2" end="2"/>
+                                            </p:txEl>
+                                          </p:spTgt>
+                                        </p:tgtEl>
+                                        <p:attrNameLst>
+                                          <p:attrName>style.visibility</p:attrName>
+                                        </p:attrNameLst>
+                                      </p:cBhvr>
+                                      <p:to>
+                                        <p:strVal val="visible"/>
+                                      </p:to>
+                                    </p:set>
+                                  </p:childTnLst>
+                                </p:cTn>
+                              </p:par>
+                            </p:childTnLst>
+                          </p:cTn>
+                        </p:par>
+                      </p:childTnLst>
+                    </p:cTn>
+                  </p:par>
+                  <p:par>
+                    <p:cTn id="15" fill="hold">
+                      <p:stCondLst>
+                        <p:cond delay="indefinite"/>
+                      </p:stCondLst>
+                      <p:childTnLst>
+                        <p:par>
+                          <p:cTn id="16" fill="hold">
+                            <p:stCondLst>
+                              <p:cond delay="0"/>
+                            </p:stCondLst>
+                            <p:childTnLst>
+                              <p:par>
+                                <p:cTn id="17" presetID="1" presetClass="entr" presetSubtype="0" fill="hold" nodeType="clickEffect">
+                                  <p:stCondLst>
+                                    <p:cond delay="0"/>
+                                  </p:stCondLst>
+                                  <p:childTnLst>
+                                    <p:set>
+                                      <p:cBhvr>
+                                        <p:cTn id="18" dur="1" fill="hold">
+                                          <p:stCondLst>
+                                            <p:cond delay="0"/>
+                                          </p:stCondLst>
+                                        </p:cTn>
+                                        <p:tgtEl>
+                                          <p:spTgt spid="3076"/>
+                                        </p:tgtEl>
+                                        <p:attrNameLst>
+                                          <p:attrName>style.visibility</p:attrName>
+                                        </p:attrNameLst>
+                                      </p:cBhvr>
+                                      <p:to>
+                                        <p:strVal val="visible"/>
+                                      </p:to>
+                                    </p:set>
+                                  </p:childTnLst>
+                                </p:cTn>
+                              </p:par>
+                            </p:childTnLst>
+                          </p:cTn>
+                        </p:par>
+                      </p:childTnLst>
+                    </p:cTn>
+                  </p:par>
+                  <p:par>
+                    <p:cTn id="19" fill="hold">
+                      <p:stCondLst>
+                        <p:cond delay="indefinite"/>
+                      </p:stCondLst>
+                      <p:childTnLst>
+                        <p:par>
+                          <p:cTn id="20" fill="hold">
+                            <p:stCondLst>
+                              <p:cond delay="0"/>
+                            </p:stCondLst>
+                            <p:childTnLst>
+                              <p:par>
+                                <p:cTn id="21" presetID="1" presetClass="entr" presetSubtype="0" fill="hold" nodeType="clickEffect">
+                                  <p:stCondLst>
+                                    <p:cond delay="0"/>
+                                  </p:stCondLst>
+                                  <p:childTnLst>
+                                    <p:set>
+                                      <p:cBhvr>
+                                        <p:cTn id="22" dur="1" fill="hold">
+                                          <p:stCondLst>
+                                            <p:cond delay="0"/>
+                                          </p:stCondLst>
+                                        </p:cTn>
+                                        <p:tgtEl>
+                                          <p:spTgt spid="3075"/>
+                                        </p:tgtEl>
+                                        <p:attrNameLst>
+                                          <p:attrName>style.visibility</p:attrName>
+                                        </p:attrNameLst>
+                                      </p:cBhvr>
+                                      <p:to>
+                                        <p:strVal val="visible"/>
+                                      </p:to>
+                                    </p:set>
+                                  </p:childTnLst>
+                                </p:cTn>
+                              </p:par>
+                            </p:childTnLst>
+                          </p:cTn>
+                        </p:par>
+                      </p:childTnLst>
+                    </p:cTn>
+                  </p:par>
+                  <p:par>
+                    <p:cTn id="23" fill="hold">
+                      <p:stCondLst>
+                        <p:cond delay="indefinite"/>
+                      </p:stCondLst>
+                      <p:childTnLst>
+                        <p:par>
+                          <p:cTn id="24" fill="hold">
+                            <p:stCondLst>
+                              <p:cond delay="0"/>
+                            </p:stCondLst>
+                            <p:childTnLst>
+                              <p:par>
+                                <p:cTn id="25" presetID="1" presetClass="entr" presetSubtype="0" fill="hold" grpId="0" nodeType="clickEffect">
+                                  <p:stCondLst>
+                                    <p:cond delay="0"/>
+                                  </p:stCondLst>
+                                  <p:childTnLst>
+                                    <p:set>
+                                      <p:cBhvr>
+                                        <p:cTn id="26" dur="1" fill="hold">
+                                          <p:stCondLst>
+                                            <p:cond delay="0"/>
+                                          </p:stCondLst>
+                                        </p:cTn>
+                                        <p:tgtEl>
+                                          <p:spTgt spid="3">
+                                            <p:txEl>
+                                              <p:pRg st="4" end="4"/>
+                                            </p:txEl>
+                                          </p:spTgt>
+                                        </p:tgtEl>
+                                        <p:attrNameLst>
+                                          <p:attrName>style.visibility</p:attrName>
+                                        </p:attrNameLst>
+                                      </p:cBhvr>
+                                      <p:to>
+                                        <p:strVal val="visible"/>
+                                      </p:to>
+                                    </p:set>
+                                  </p:childTnLst>
+                                </p:cTn>
+                              </p:par>
+                            </p:childTnLst>
+                          </p:cTn>
+                        </p:par>
+                      </p:childTnLst>
+                    </p:cTn>
+                  </p:par>
+                  <p:par>
+                    <p:cTn id="27" fill="hold">
+                      <p:stCondLst>
+                        <p:cond delay="indefinite"/>
+                      </p:stCondLst>
+                      <p:childTnLst>
+                        <p:par>
+                          <p:cTn id="28" fill="hold">
+                            <p:stCondLst>
+                              <p:cond delay="0"/>
+                            </p:stCondLst>
+                            <p:childTnLst>
+                              <p:par>
+                                <p:cTn id="29" presetID="1" presetClass="entr" presetSubtype="0" fill="hold" nodeType="clickEffect">
+                                  <p:stCondLst>
+                                    <p:cond delay="0"/>
+                                  </p:stCondLst>
+                                  <p:childTnLst>
+                                    <p:set>
+                                      <p:cBhvr>
+                                        <p:cTn id="30" dur="1" fill="hold">
                                           <p:stCondLst>
                                             <p:cond delay="0"/>
                                           </p:stCondLst>
@@ -6624,6 +6905,9 @@
         </p:cTn>
       </p:par>
     </p:tnLst>
+    <p:bldLst>
+      <p:bldP spid="3" grpId="0" uiExpand="1" build="p"/>
+    </p:bldLst>
   </p:timing>
 </p:sld>
 </file>
@@ -6920,9 +7204,268 @@
   <p:timing>
     <p:tnLst>
       <p:par>
-        <p:cTn id="1" dur="indefinite" restart="never" nodeType="tmRoot"/>
+        <p:cTn id="1" dur="indefinite" restart="never" nodeType="tmRoot">
+          <p:childTnLst>
+            <p:seq concurrent="1" nextAc="seek">
+              <p:cTn id="2" dur="indefinite" nodeType="mainSeq">
+                <p:childTnLst>
+                  <p:par>
+                    <p:cTn id="3" fill="hold">
+                      <p:stCondLst>
+                        <p:cond delay="indefinite"/>
+                      </p:stCondLst>
+                      <p:childTnLst>
+                        <p:par>
+                          <p:cTn id="4" fill="hold">
+                            <p:stCondLst>
+                              <p:cond delay="0"/>
+                            </p:stCondLst>
+                            <p:childTnLst>
+                              <p:par>
+                                <p:cTn id="5" presetID="1" presetClass="entr" presetSubtype="0" fill="hold" grpId="0" nodeType="clickEffect">
+                                  <p:stCondLst>
+                                    <p:cond delay="0"/>
+                                  </p:stCondLst>
+                                  <p:childTnLst>
+                                    <p:set>
+                                      <p:cBhvr>
+                                        <p:cTn id="6" dur="1" fill="hold">
+                                          <p:stCondLst>
+                                            <p:cond delay="0"/>
+                                          </p:stCondLst>
+                                        </p:cTn>
+                                        <p:tgtEl>
+                                          <p:spTgt spid="3">
+                                            <p:txEl>
+                                              <p:pRg st="0" end="0"/>
+                                            </p:txEl>
+                                          </p:spTgt>
+                                        </p:tgtEl>
+                                        <p:attrNameLst>
+                                          <p:attrName>style.visibility</p:attrName>
+                                        </p:attrNameLst>
+                                      </p:cBhvr>
+                                      <p:to>
+                                        <p:strVal val="visible"/>
+                                      </p:to>
+                                    </p:set>
+                                  </p:childTnLst>
+                                </p:cTn>
+                              </p:par>
+                            </p:childTnLst>
+                          </p:cTn>
+                        </p:par>
+                      </p:childTnLst>
+                    </p:cTn>
+                  </p:par>
+                  <p:par>
+                    <p:cTn id="7" fill="hold">
+                      <p:stCondLst>
+                        <p:cond delay="indefinite"/>
+                      </p:stCondLst>
+                      <p:childTnLst>
+                        <p:par>
+                          <p:cTn id="8" fill="hold">
+                            <p:stCondLst>
+                              <p:cond delay="0"/>
+                            </p:stCondLst>
+                            <p:childTnLst>
+                              <p:par>
+                                <p:cTn id="9" presetID="1" presetClass="entr" presetSubtype="0" fill="hold" nodeType="clickEffect">
+                                  <p:stCondLst>
+                                    <p:cond delay="0"/>
+                                  </p:stCondLst>
+                                  <p:childTnLst>
+                                    <p:set>
+                                      <p:cBhvr>
+                                        <p:cTn id="10" dur="1" fill="hold">
+                                          <p:stCondLst>
+                                            <p:cond delay="0"/>
+                                          </p:stCondLst>
+                                        </p:cTn>
+                                        <p:tgtEl>
+                                          <p:spTgt spid="4098"/>
+                                        </p:tgtEl>
+                                        <p:attrNameLst>
+                                          <p:attrName>style.visibility</p:attrName>
+                                        </p:attrNameLst>
+                                      </p:cBhvr>
+                                      <p:to>
+                                        <p:strVal val="visible"/>
+                                      </p:to>
+                                    </p:set>
+                                  </p:childTnLst>
+                                </p:cTn>
+                              </p:par>
+                            </p:childTnLst>
+                          </p:cTn>
+                        </p:par>
+                      </p:childTnLst>
+                    </p:cTn>
+                  </p:par>
+                  <p:par>
+                    <p:cTn id="11" fill="hold">
+                      <p:stCondLst>
+                        <p:cond delay="indefinite"/>
+                      </p:stCondLst>
+                      <p:childTnLst>
+                        <p:par>
+                          <p:cTn id="12" fill="hold">
+                            <p:stCondLst>
+                              <p:cond delay="0"/>
+                            </p:stCondLst>
+                            <p:childTnLst>
+                              <p:par>
+                                <p:cTn id="13" presetID="1" presetClass="entr" presetSubtype="0" fill="hold" grpId="0" nodeType="clickEffect">
+                                  <p:stCondLst>
+                                    <p:cond delay="0"/>
+                                  </p:stCondLst>
+                                  <p:childTnLst>
+                                    <p:set>
+                                      <p:cBhvr>
+                                        <p:cTn id="14" dur="1" fill="hold">
+                                          <p:stCondLst>
+                                            <p:cond delay="0"/>
+                                          </p:stCondLst>
+                                        </p:cTn>
+                                        <p:tgtEl>
+                                          <p:spTgt spid="3">
+                                            <p:txEl>
+                                              <p:pRg st="3" end="3"/>
+                                            </p:txEl>
+                                          </p:spTgt>
+                                        </p:tgtEl>
+                                        <p:attrNameLst>
+                                          <p:attrName>style.visibility</p:attrName>
+                                        </p:attrNameLst>
+                                      </p:cBhvr>
+                                      <p:to>
+                                        <p:strVal val="visible"/>
+                                      </p:to>
+                                    </p:set>
+                                  </p:childTnLst>
+                                </p:cTn>
+                              </p:par>
+                            </p:childTnLst>
+                          </p:cTn>
+                        </p:par>
+                      </p:childTnLst>
+                    </p:cTn>
+                  </p:par>
+                  <p:par>
+                    <p:cTn id="15" fill="hold">
+                      <p:stCondLst>
+                        <p:cond delay="indefinite"/>
+                      </p:stCondLst>
+                      <p:childTnLst>
+                        <p:par>
+                          <p:cTn id="16" fill="hold">
+                            <p:stCondLst>
+                              <p:cond delay="0"/>
+                            </p:stCondLst>
+                            <p:childTnLst>
+                              <p:par>
+                                <p:cTn id="17" presetID="1" presetClass="entr" presetSubtype="0" fill="hold" nodeType="clickEffect">
+                                  <p:stCondLst>
+                                    <p:cond delay="0"/>
+                                  </p:stCondLst>
+                                  <p:childTnLst>
+                                    <p:set>
+                                      <p:cBhvr>
+                                        <p:cTn id="18" dur="1" fill="hold">
+                                          <p:stCondLst>
+                                            <p:cond delay="0"/>
+                                          </p:stCondLst>
+                                        </p:cTn>
+                                        <p:tgtEl>
+                                          <p:spTgt spid="4100"/>
+                                        </p:tgtEl>
+                                        <p:attrNameLst>
+                                          <p:attrName>style.visibility</p:attrName>
+                                        </p:attrNameLst>
+                                      </p:cBhvr>
+                                      <p:to>
+                                        <p:strVal val="visible"/>
+                                      </p:to>
+                                    </p:set>
+                                  </p:childTnLst>
+                                </p:cTn>
+                              </p:par>
+                            </p:childTnLst>
+                          </p:cTn>
+                        </p:par>
+                      </p:childTnLst>
+                    </p:cTn>
+                  </p:par>
+                  <p:par>
+                    <p:cTn id="19" fill="hold">
+                      <p:stCondLst>
+                        <p:cond delay="indefinite"/>
+                      </p:stCondLst>
+                      <p:childTnLst>
+                        <p:par>
+                          <p:cTn id="20" fill="hold">
+                            <p:stCondLst>
+                              <p:cond delay="0"/>
+                            </p:stCondLst>
+                            <p:childTnLst>
+                              <p:par>
+                                <p:cTn id="21" presetID="1" presetClass="entr" presetSubtype="0" fill="hold" nodeType="clickEffect">
+                                  <p:stCondLst>
+                                    <p:cond delay="0"/>
+                                  </p:stCondLst>
+                                  <p:childTnLst>
+                                    <p:set>
+                                      <p:cBhvr>
+                                        <p:cTn id="22" dur="1" fill="hold">
+                                          <p:stCondLst>
+                                            <p:cond delay="0"/>
+                                          </p:stCondLst>
+                                        </p:cTn>
+                                        <p:tgtEl>
+                                          <p:spTgt spid="4099"/>
+                                        </p:tgtEl>
+                                        <p:attrNameLst>
+                                          <p:attrName>style.visibility</p:attrName>
+                                        </p:attrNameLst>
+                                      </p:cBhvr>
+                                      <p:to>
+                                        <p:strVal val="visible"/>
+                                      </p:to>
+                                    </p:set>
+                                  </p:childTnLst>
+                                </p:cTn>
+                              </p:par>
+                            </p:childTnLst>
+                          </p:cTn>
+                        </p:par>
+                      </p:childTnLst>
+                    </p:cTn>
+                  </p:par>
+                </p:childTnLst>
+              </p:cTn>
+              <p:prevCondLst>
+                <p:cond evt="onPrev" delay="0">
+                  <p:tgtEl>
+                    <p:sldTgt/>
+                  </p:tgtEl>
+                </p:cond>
+              </p:prevCondLst>
+              <p:nextCondLst>
+                <p:cond evt="onNext" delay="0">
+                  <p:tgtEl>
+                    <p:sldTgt/>
+                  </p:tgtEl>
+                </p:cond>
+              </p:nextCondLst>
+            </p:seq>
+          </p:childTnLst>
+        </p:cTn>
       </p:par>
     </p:tnLst>
+    <p:bldLst>
+      <p:bldP spid="3" grpId="0" uiExpand="1" build="p"/>
+    </p:bldLst>
   </p:timing>
 </p:sld>
 </file>
@@ -7093,9 +7636,178 @@
   <p:timing>
     <p:tnLst>
       <p:par>
-        <p:cTn id="1" dur="indefinite" restart="never" nodeType="tmRoot"/>
+        <p:cTn id="1" dur="indefinite" restart="never" nodeType="tmRoot">
+          <p:childTnLst>
+            <p:seq concurrent="1" nextAc="seek">
+              <p:cTn id="2" dur="indefinite" nodeType="mainSeq">
+                <p:childTnLst>
+                  <p:par>
+                    <p:cTn id="3" fill="hold">
+                      <p:stCondLst>
+                        <p:cond delay="indefinite"/>
+                      </p:stCondLst>
+                      <p:childTnLst>
+                        <p:par>
+                          <p:cTn id="4" fill="hold">
+                            <p:stCondLst>
+                              <p:cond delay="0"/>
+                            </p:stCondLst>
+                            <p:childTnLst>
+                              <p:par>
+                                <p:cTn id="5" presetID="1" presetClass="entr" presetSubtype="0" fill="hold" grpId="0" nodeType="clickEffect">
+                                  <p:stCondLst>
+                                    <p:cond delay="0"/>
+                                  </p:stCondLst>
+                                  <p:childTnLst>
+                                    <p:set>
+                                      <p:cBhvr>
+                                        <p:cTn id="6" dur="1" fill="hold">
+                                          <p:stCondLst>
+                                            <p:cond delay="0"/>
+                                          </p:stCondLst>
+                                        </p:cTn>
+                                        <p:tgtEl>
+                                          <p:spTgt spid="3">
+                                            <p:txEl>
+                                              <p:pRg st="0" end="0"/>
+                                            </p:txEl>
+                                          </p:spTgt>
+                                        </p:tgtEl>
+                                        <p:attrNameLst>
+                                          <p:attrName>style.visibility</p:attrName>
+                                        </p:attrNameLst>
+                                      </p:cBhvr>
+                                      <p:to>
+                                        <p:strVal val="visible"/>
+                                      </p:to>
+                                    </p:set>
+                                  </p:childTnLst>
+                                </p:cTn>
+                              </p:par>
+                            </p:childTnLst>
+                          </p:cTn>
+                        </p:par>
+                      </p:childTnLst>
+                    </p:cTn>
+                  </p:par>
+                  <p:par>
+                    <p:cTn id="7" fill="hold">
+                      <p:stCondLst>
+                        <p:cond delay="indefinite"/>
+                      </p:stCondLst>
+                      <p:childTnLst>
+                        <p:par>
+                          <p:cTn id="8" fill="hold">
+                            <p:stCondLst>
+                              <p:cond delay="0"/>
+                            </p:stCondLst>
+                            <p:childTnLst>
+                              <p:par>
+                                <p:cTn id="9" presetID="1" presetClass="entr" presetSubtype="0" fill="hold" nodeType="clickEffect">
+                                  <p:stCondLst>
+                                    <p:cond delay="0"/>
+                                  </p:stCondLst>
+                                  <p:childTnLst>
+                                    <p:set>
+                                      <p:cBhvr>
+                                        <p:cTn id="10" dur="1" fill="hold">
+                                          <p:stCondLst>
+                                            <p:cond delay="0"/>
+                                          </p:stCondLst>
+                                        </p:cTn>
+                                        <p:tgtEl>
+                                          <p:spTgt spid="5122"/>
+                                        </p:tgtEl>
+                                        <p:attrNameLst>
+                                          <p:attrName>style.visibility</p:attrName>
+                                        </p:attrNameLst>
+                                      </p:cBhvr>
+                                      <p:to>
+                                        <p:strVal val="visible"/>
+                                      </p:to>
+                                    </p:set>
+                                  </p:childTnLst>
+                                </p:cTn>
+                              </p:par>
+                            </p:childTnLst>
+                          </p:cTn>
+                        </p:par>
+                      </p:childTnLst>
+                    </p:cTn>
+                  </p:par>
+                  <p:par>
+                    <p:cTn id="11" fill="hold">
+                      <p:stCondLst>
+                        <p:cond delay="indefinite"/>
+                      </p:stCondLst>
+                      <p:childTnLst>
+                        <p:par>
+                          <p:cTn id="12" fill="hold">
+                            <p:stCondLst>
+                              <p:cond delay="0"/>
+                            </p:stCondLst>
+                            <p:childTnLst>
+                              <p:par>
+                                <p:cTn id="13" presetID="1" presetClass="entr" presetSubtype="0" fill="hold" grpId="0" nodeType="clickEffect">
+                                  <p:stCondLst>
+                                    <p:cond delay="0"/>
+                                  </p:stCondLst>
+                                  <p:childTnLst>
+                                    <p:set>
+                                      <p:cBhvr>
+                                        <p:cTn id="14" dur="1" fill="hold">
+                                          <p:stCondLst>
+                                            <p:cond delay="0"/>
+                                          </p:stCondLst>
+                                        </p:cTn>
+                                        <p:tgtEl>
+                                          <p:spTgt spid="3">
+                                            <p:txEl>
+                                              <p:pRg st="5" end="5"/>
+                                            </p:txEl>
+                                          </p:spTgt>
+                                        </p:tgtEl>
+                                        <p:attrNameLst>
+                                          <p:attrName>style.visibility</p:attrName>
+                                        </p:attrNameLst>
+                                      </p:cBhvr>
+                                      <p:to>
+                                        <p:strVal val="visible"/>
+                                      </p:to>
+                                    </p:set>
+                                  </p:childTnLst>
+                                </p:cTn>
+                              </p:par>
+                            </p:childTnLst>
+                          </p:cTn>
+                        </p:par>
+                      </p:childTnLst>
+                    </p:cTn>
+                  </p:par>
+                </p:childTnLst>
+              </p:cTn>
+              <p:prevCondLst>
+                <p:cond evt="onPrev" delay="0">
+                  <p:tgtEl>
+                    <p:sldTgt/>
+                  </p:tgtEl>
+                </p:cond>
+              </p:prevCondLst>
+              <p:nextCondLst>
+                <p:cond evt="onNext" delay="0">
+                  <p:tgtEl>
+                    <p:sldTgt/>
+                  </p:tgtEl>
+                </p:cond>
+              </p:nextCondLst>
+            </p:seq>
+          </p:childTnLst>
+        </p:cTn>
       </p:par>
     </p:tnLst>
+    <p:bldLst>
+      <p:bldP spid="3" grpId="0" uiExpand="1" build="p"/>
+    </p:bldLst>
   </p:timing>
 </p:sld>
 </file>

</xml_diff>